<commit_message>
Change top and add some images
</commit_message>
<xml_diff>
--- a/images/folio_img/folio.pptx
+++ b/images/folio_img/folio.pptx
@@ -9,6 +9,8 @@
     <p:sldId id="257" r:id="rId3"/>
     <p:sldId id="258" r:id="rId4"/>
     <p:sldId id="259" r:id="rId5"/>
+    <p:sldId id="260" r:id="rId6"/>
+    <p:sldId id="261" r:id="rId7"/>
   </p:sldIdLst>
   <p:sldSz cx="9144000" cy="6858000" type="screen4x3"/>
   <p:notesSz cx="6858000" cy="9144000"/>
@@ -3250,8 +3252,8 @@
         </p:nvSpPr>
         <p:spPr>
           <a:xfrm>
-            <a:off x="4624202" y="3659201"/>
-            <a:ext cx="3271837" cy="1107996"/>
+            <a:off x="4782694" y="3724847"/>
+            <a:ext cx="3271837" cy="1200329"/>
           </a:xfrm>
           <a:prstGeom prst="rect">
             <a:avLst/>
@@ -3266,7 +3268,7 @@
           <a:p>
             <a:pPr algn="ctr"/>
             <a:r>
-              <a:rPr lang="en-US" altLang="ja-JP" sz="6600" dirty="0" smtClean="0">
+              <a:rPr lang="en-US" altLang="ja-JP" sz="7200" dirty="0" smtClean="0">
                 <a:ln w="0"/>
                 <a:solidFill>
                   <a:schemeClr val="bg1"/>
@@ -3280,7 +3282,7 @@
               </a:rPr>
               <a:t>LINE Bot AI</a:t>
             </a:r>
-            <a:endParaRPr lang="ja-JP" altLang="en-US" sz="6600" dirty="0">
+            <a:endParaRPr lang="ja-JP" altLang="en-US" sz="7200" dirty="0">
               <a:ln w="0"/>
               <a:solidFill>
                 <a:schemeClr val="bg1"/>
@@ -3317,7 +3319,7 @@
         </p:blipFill>
         <p:spPr>
           <a:xfrm>
-            <a:off x="5747314" y="2344694"/>
+            <a:off x="5905806" y="1966742"/>
             <a:ext cx="1025611" cy="1025611"/>
           </a:xfrm>
           <a:prstGeom prst="rect">
@@ -3337,7 +3339,7 @@
       </p:pic>
       <p:pic>
         <p:nvPicPr>
-          <p:cNvPr id="7" name="図 6"/>
+          <p:cNvPr id="8" name="図 7"/>
           <p:cNvPicPr>
             <a:picLocks noChangeAspect="1"/>
           </p:cNvPicPr>
@@ -3357,8 +3359,38 @@
         </p:blipFill>
         <p:spPr>
           <a:xfrm>
-            <a:off x="1303649" y="694944"/>
-            <a:ext cx="2821897" cy="5468112"/>
+            <a:off x="1603569" y="972220"/>
+            <a:ext cx="2079464" cy="4500483"/>
+          </a:xfrm>
+          <a:prstGeom prst="rect">
+            <a:avLst/>
+          </a:prstGeom>
+        </p:spPr>
+      </p:pic>
+      <p:pic>
+        <p:nvPicPr>
+          <p:cNvPr id="7" name="図 6"/>
+          <p:cNvPicPr>
+            <a:picLocks noChangeAspect="1"/>
+          </p:cNvPicPr>
+          <p:nvPr/>
+        </p:nvPicPr>
+        <p:blipFill>
+          <a:blip r:embed="rId4">
+            <a:extLst>
+              <a:ext uri="{28A0092B-C50C-407E-A947-70E740481C1C}">
+                <a14:useLocalDpi xmlns:a14="http://schemas.microsoft.com/office/drawing/2010/main" val="0"/>
+              </a:ext>
+            </a:extLst>
+          </a:blip>
+          <a:stretch>
+            <a:fillRect/>
+          </a:stretch>
+        </p:blipFill>
+        <p:spPr>
+          <a:xfrm>
+            <a:off x="1357769" y="755903"/>
+            <a:ext cx="2562411" cy="4965295"/>
           </a:xfrm>
           <a:prstGeom prst="rect">
             <a:avLst/>
@@ -3910,6 +3942,176 @@
 </p:sld>
 </file>
 
+<file path=ppt/slides/slide5.xml><?xml version="1.0" encoding="utf-8"?>
+<p:sld xmlns:a="http://schemas.openxmlformats.org/drawingml/2006/main" xmlns:r="http://schemas.openxmlformats.org/officeDocument/2006/relationships" xmlns:p="http://schemas.openxmlformats.org/presentationml/2006/main">
+  <p:cSld>
+    <p:spTree>
+      <p:nvGrpSpPr>
+        <p:cNvPr id="1" name=""/>
+        <p:cNvGrpSpPr/>
+        <p:nvPr/>
+      </p:nvGrpSpPr>
+      <p:grpSpPr>
+        <a:xfrm>
+          <a:off x="0" y="0"/>
+          <a:ext cx="0" cy="0"/>
+          <a:chOff x="0" y="0"/>
+          <a:chExt cx="0" cy="0"/>
+        </a:xfrm>
+      </p:grpSpPr>
+      <p:pic>
+        <p:nvPicPr>
+          <p:cNvPr id="2" name="図 1"/>
+          <p:cNvPicPr>
+            <a:picLocks noChangeAspect="1"/>
+          </p:cNvPicPr>
+          <p:nvPr/>
+        </p:nvPicPr>
+        <p:blipFill>
+          <a:blip r:embed="rId2">
+            <a:extLst>
+              <a:ext uri="{28A0092B-C50C-407E-A947-70E740481C1C}">
+                <a14:useLocalDpi xmlns:a14="http://schemas.microsoft.com/office/drawing/2010/main" val="0"/>
+              </a:ext>
+            </a:extLst>
+          </a:blip>
+          <a:stretch>
+            <a:fillRect/>
+          </a:stretch>
+        </p:blipFill>
+        <p:spPr>
+          <a:xfrm>
+            <a:off x="2356006" y="1207008"/>
+            <a:ext cx="4269837" cy="4138168"/>
+          </a:xfrm>
+          <a:prstGeom prst="rect">
+            <a:avLst/>
+          </a:prstGeom>
+        </p:spPr>
+      </p:pic>
+    </p:spTree>
+    <p:extLst>
+      <p:ext uri="{BB962C8B-B14F-4D97-AF65-F5344CB8AC3E}">
+        <p14:creationId xmlns:p14="http://schemas.microsoft.com/office/powerpoint/2010/main" val="1262696576"/>
+      </p:ext>
+    </p:extLst>
+  </p:cSld>
+  <p:clrMapOvr>
+    <a:masterClrMapping/>
+  </p:clrMapOvr>
+</p:sld>
+</file>
+
+<file path=ppt/slides/slide6.xml><?xml version="1.0" encoding="utf-8"?>
+<p:sld xmlns:a="http://schemas.openxmlformats.org/drawingml/2006/main" xmlns:r="http://schemas.openxmlformats.org/officeDocument/2006/relationships" xmlns:p="http://schemas.openxmlformats.org/presentationml/2006/main">
+  <p:cSld>
+    <p:spTree>
+      <p:nvGrpSpPr>
+        <p:cNvPr id="1" name=""/>
+        <p:cNvGrpSpPr/>
+        <p:nvPr/>
+      </p:nvGrpSpPr>
+      <p:grpSpPr>
+        <a:xfrm>
+          <a:off x="0" y="0"/>
+          <a:ext cx="0" cy="0"/>
+          <a:chOff x="0" y="0"/>
+          <a:chExt cx="0" cy="0"/>
+        </a:xfrm>
+      </p:grpSpPr>
+      <p:pic>
+        <p:nvPicPr>
+          <p:cNvPr id="2" name="図 1"/>
+          <p:cNvPicPr>
+            <a:picLocks noChangeAspect="1"/>
+          </p:cNvPicPr>
+          <p:nvPr/>
+        </p:nvPicPr>
+        <p:blipFill>
+          <a:blip r:embed="rId2">
+            <a:extLst>
+              <a:ext uri="{28A0092B-C50C-407E-A947-70E740481C1C}">
+                <a14:useLocalDpi xmlns:a14="http://schemas.microsoft.com/office/drawing/2010/main" val="0"/>
+              </a:ext>
+            </a:extLst>
+          </a:blip>
+          <a:stretch>
+            <a:fillRect/>
+          </a:stretch>
+        </p:blipFill>
+        <p:spPr>
+          <a:xfrm>
+            <a:off x="234070" y="1121664"/>
+            <a:ext cx="8544170" cy="4442968"/>
+          </a:xfrm>
+          <a:prstGeom prst="rect">
+            <a:avLst/>
+          </a:prstGeom>
+        </p:spPr>
+      </p:pic>
+      <p:sp>
+        <p:nvSpPr>
+          <p:cNvPr id="3" name="テキスト ボックス 2"/>
+          <p:cNvSpPr txBox="1"/>
+          <p:nvPr/>
+        </p:nvSpPr>
+        <p:spPr>
+          <a:xfrm>
+            <a:off x="1811723" y="5888736"/>
+            <a:ext cx="5388864" cy="923330"/>
+          </a:xfrm>
+          <a:prstGeom prst="rect">
+            <a:avLst/>
+          </a:prstGeom>
+          <a:noFill/>
+        </p:spPr>
+        <p:txBody>
+          <a:bodyPr wrap="square" rtlCol="0">
+            <a:spAutoFit/>
+          </a:bodyPr>
+          <a:lstStyle/>
+          <a:p>
+            <a:r>
+              <a:rPr kumimoji="1" lang="en-US" altLang="ja-JP" dirty="0" smtClean="0">
+                <a:hlinkClick r:id="rId3"/>
+              </a:rPr>
+              <a:t>takashi@gmail.com</a:t>
+            </a:r>
+            <a:endParaRPr kumimoji="1" lang="en-US" altLang="ja-JP" dirty="0" smtClean="0"/>
+          </a:p>
+          <a:p>
+            <a:r>
+              <a:rPr lang="en-US" altLang="ja-JP" dirty="0" smtClean="0">
+                <a:hlinkClick r:id="rId4"/>
+              </a:rPr>
+              <a:t>prezy@gmail.com</a:t>
+            </a:r>
+            <a:endParaRPr lang="en-US" altLang="ja-JP" dirty="0" smtClean="0"/>
+          </a:p>
+          <a:p>
+            <a:r>
+              <a:rPr kumimoji="1" lang="en-US" altLang="ja-JP" dirty="0" smtClean="0">
+                <a:hlinkClick r:id="rId5"/>
+              </a:rPr>
+              <a:t>nunoriku@gmail.com</a:t>
+            </a:r>
+            <a:endParaRPr kumimoji="1" lang="ja-JP" altLang="en-US" dirty="0"/>
+          </a:p>
+        </p:txBody>
+      </p:sp>
+    </p:spTree>
+    <p:extLst>
+      <p:ext uri="{BB962C8B-B14F-4D97-AF65-F5344CB8AC3E}">
+        <p14:creationId xmlns:p14="http://schemas.microsoft.com/office/powerpoint/2010/main" val="38535563"/>
+      </p:ext>
+    </p:extLst>
+  </p:cSld>
+  <p:clrMapOvr>
+    <a:masterClrMapping/>
+  </p:clrMapOvr>
+</p:sld>
+</file>
+
 <file path=ppt/theme/theme1.xml><?xml version="1.0" encoding="utf-8"?>
 <a:theme xmlns:a="http://schemas.openxmlformats.org/drawingml/2006/main" name="ホワイト">
   <a:themeElements>

</xml_diff>